<commit_message>
delete PLF 3-0 developer training
</commit_message>
<xml_diff>
--- a/plf3_5/eXoFundamentals/060-Features/060-Features.pptx
+++ b/plf3_5/eXoFundamentals/060-Features/060-Features.pptx
@@ -5,7 +5,7 @@
     <p:sldMasterId id="2147483736" r:id="rId1"/>
   </p:sldMasterIdLst>
   <p:sldIdLst>
-    <p:sldId id="256" r:id="rId2"/>
+    <p:sldId id="279" r:id="rId2"/>
     <p:sldId id="257" r:id="rId3"/>
     <p:sldId id="259" r:id="rId4"/>
     <p:sldId id="269" r:id="rId5"/>
@@ -8132,7 +8132,7 @@
           <a:p>
             <a:r>
               <a:rPr lang="en-US" dirty="0" smtClean="0"/>
-              <a:t>eXo Features</a:t>
+              <a:t>Social Features</a:t>
             </a:r>
             <a:endParaRPr lang="en-US" dirty="0"/>
           </a:p>
@@ -8153,56 +8153,14 @@
           <a:bodyPr/>
           <a:lstStyle/>
           <a:p>
-            <a:r>
-              <a:rPr lang="en-US" dirty="0" smtClean="0"/>
-              <a:t>Social, Knowledge and Collaboration</a:t>
-            </a:r>
-            <a:endParaRPr lang="en-US" dirty="0"/>
-          </a:p>
-        </p:txBody>
-      </p:sp>
-      <p:sp>
-        <p:nvSpPr>
-          <p:cNvPr id="4" name="Espace réservé du texte 3"/>
-          <p:cNvSpPr>
-            <a:spLocks noGrp="1"/>
-          </p:cNvSpPr>
-          <p:nvPr>
-            <p:ph type="body" sz="quarter" idx="13"/>
-          </p:nvPr>
-        </p:nvSpPr>
-        <p:spPr/>
-        <p:txBody>
-          <a:bodyPr/>
-          <a:lstStyle/>
-          <a:p>
-            <a:endParaRPr lang="en-US" dirty="0"/>
-          </a:p>
-        </p:txBody>
-      </p:sp>
-      <p:sp>
-        <p:nvSpPr>
-          <p:cNvPr id="5" name="Espace réservé du texte 4"/>
-          <p:cNvSpPr>
-            <a:spLocks noGrp="1"/>
-          </p:cNvSpPr>
-          <p:nvPr>
-            <p:ph type="body" sz="quarter" idx="14"/>
-          </p:nvPr>
-        </p:nvSpPr>
-        <p:spPr/>
-        <p:txBody>
-          <a:bodyPr/>
-          <a:lstStyle/>
-          <a:p>
-            <a:endParaRPr lang="en-US" dirty="0"/>
+            <a:endParaRPr lang="en-US"/>
           </a:p>
         </p:txBody>
       </p:sp>
     </p:spTree>
     <p:extLst>
       <p:ext uri="{BB962C8B-B14F-4D97-AF65-F5344CB8AC3E}">
-        <p14:creationId xmlns:p14="http://schemas.microsoft.com/office/powerpoint/2010/main" val="1924364527"/>
+        <p14:creationId xmlns:p14="http://schemas.microsoft.com/office/powerpoint/2010/main" val="4100358046"/>
       </p:ext>
     </p:extLst>
   </p:cSld>
@@ -8463,6 +8421,13 @@
   <p:clrMapOvr>
     <a:masterClrMapping/>
   </p:clrMapOvr>
+  <p:timing>
+    <p:tnLst>
+      <p:par>
+        <p:cTn xmlns:p14="http://schemas.microsoft.com/office/powerpoint/2010/main" id="1" dur="indefinite" restart="never" nodeType="tmRoot"/>
+      </p:par>
+    </p:tnLst>
+  </p:timing>
 </p:sld>
 </file>
 
@@ -8614,6 +8579,13 @@
   <p:clrMapOvr>
     <a:masterClrMapping/>
   </p:clrMapOvr>
+  <p:timing>
+    <p:tnLst>
+      <p:par>
+        <p:cTn xmlns:p14="http://schemas.microsoft.com/office/powerpoint/2010/main" id="1" dur="indefinite" restart="never" nodeType="tmRoot"/>
+      </p:par>
+    </p:tnLst>
+  </p:timing>
 </p:sld>
 </file>
 
@@ -8767,6 +8739,13 @@
   <p:clrMapOvr>
     <a:masterClrMapping/>
   </p:clrMapOvr>
+  <p:timing>
+    <p:tnLst>
+      <p:par>
+        <p:cTn xmlns:p14="http://schemas.microsoft.com/office/powerpoint/2010/main" id="1" dur="indefinite" restart="never" nodeType="tmRoot"/>
+      </p:par>
+    </p:tnLst>
+  </p:timing>
 </p:sld>
 </file>
 
@@ -8904,6 +8883,13 @@
   <p:clrMapOvr>
     <a:masterClrMapping/>
   </p:clrMapOvr>
+  <p:timing>
+    <p:tnLst>
+      <p:par>
+        <p:cTn xmlns:p14="http://schemas.microsoft.com/office/powerpoint/2010/main" id="1" dur="indefinite" restart="never" nodeType="tmRoot"/>
+      </p:par>
+    </p:tnLst>
+  </p:timing>
 </p:sld>
 </file>
 
@@ -9114,6 +9100,13 @@
   <p:clrMapOvr>
     <a:masterClrMapping/>
   </p:clrMapOvr>
+  <p:timing>
+    <p:tnLst>
+      <p:par>
+        <p:cTn xmlns:p14="http://schemas.microsoft.com/office/powerpoint/2010/main" id="1" dur="indefinite" restart="never" nodeType="tmRoot"/>
+      </p:par>
+    </p:tnLst>
+  </p:timing>
 </p:sld>
 </file>
 
@@ -9258,6 +9251,13 @@
   <p:clrMapOvr>
     <a:masterClrMapping/>
   </p:clrMapOvr>
+  <p:timing>
+    <p:tnLst>
+      <p:par>
+        <p:cTn xmlns:p14="http://schemas.microsoft.com/office/powerpoint/2010/main" id="1" dur="indefinite" restart="never" nodeType="tmRoot"/>
+      </p:par>
+    </p:tnLst>
+  </p:timing>
 </p:sld>
 </file>
 
@@ -9397,6 +9397,13 @@
   <p:clrMapOvr>
     <a:masterClrMapping/>
   </p:clrMapOvr>
+  <p:timing>
+    <p:tnLst>
+      <p:par>
+        <p:cTn xmlns:p14="http://schemas.microsoft.com/office/powerpoint/2010/main" id="1" dur="indefinite" restart="never" nodeType="tmRoot"/>
+      </p:par>
+    </p:tnLst>
+  </p:timing>
 </p:sld>
 </file>
 
@@ -9559,6 +9566,13 @@
   <p:clrMapOvr>
     <a:masterClrMapping/>
   </p:clrMapOvr>
+  <p:timing>
+    <p:tnLst>
+      <p:par>
+        <p:cTn xmlns:p14="http://schemas.microsoft.com/office/powerpoint/2010/main" id="1" dur="indefinite" restart="never" nodeType="tmRoot"/>
+      </p:par>
+    </p:tnLst>
+  </p:timing>
 </p:sld>
 </file>
 
@@ -9678,6 +9692,13 @@
   <p:clrMapOvr>
     <a:masterClrMapping/>
   </p:clrMapOvr>
+  <p:timing>
+    <p:tnLst>
+      <p:par>
+        <p:cTn xmlns:p14="http://schemas.microsoft.com/office/powerpoint/2010/main" id="1" dur="indefinite" restart="never" nodeType="tmRoot"/>
+      </p:par>
+    </p:tnLst>
+  </p:timing>
 </p:sld>
 </file>
 
@@ -9951,6 +9972,13 @@
   <p:clrMapOvr>
     <a:masterClrMapping/>
   </p:clrMapOvr>
+  <p:timing>
+    <p:tnLst>
+      <p:par>
+        <p:cTn xmlns:p14="http://schemas.microsoft.com/office/powerpoint/2010/main" id="1" dur="indefinite" restart="never" nodeType="tmRoot"/>
+      </p:par>
+    </p:tnLst>
+  </p:timing>
 </p:sld>
 </file>
 
@@ -10090,6 +10118,13 @@
   <p:clrMapOvr>
     <a:masterClrMapping/>
   </p:clrMapOvr>
+  <p:timing>
+    <p:tnLst>
+      <p:par>
+        <p:cTn xmlns:p14="http://schemas.microsoft.com/office/powerpoint/2010/main" id="1" dur="indefinite" restart="never" nodeType="tmRoot"/>
+      </p:par>
+    </p:tnLst>
+  </p:timing>
 </p:sld>
 </file>
 
@@ -10282,6 +10317,13 @@
   <p:clrMapOvr>
     <a:masterClrMapping/>
   </p:clrMapOvr>
+  <p:timing>
+    <p:tnLst>
+      <p:par>
+        <p:cTn xmlns:p14="http://schemas.microsoft.com/office/powerpoint/2010/main" id="1" dur="indefinite" restart="never" nodeType="tmRoot"/>
+      </p:par>
+    </p:tnLst>
+  </p:timing>
 </p:sld>
 </file>
 
@@ -10514,6 +10556,13 @@
   <p:clrMapOvr>
     <a:masterClrMapping/>
   </p:clrMapOvr>
+  <p:timing>
+    <p:tnLst>
+      <p:par>
+        <p:cTn xmlns:p14="http://schemas.microsoft.com/office/powerpoint/2010/main" id="1" dur="indefinite" restart="never" nodeType="tmRoot"/>
+      </p:par>
+    </p:tnLst>
+  </p:timing>
 </p:sld>
 </file>
 
@@ -10622,6 +10671,13 @@
   <p:clrMapOvr>
     <a:masterClrMapping/>
   </p:clrMapOvr>
+  <p:timing>
+    <p:tnLst>
+      <p:par>
+        <p:cTn xmlns:p14="http://schemas.microsoft.com/office/powerpoint/2010/main" id="1" dur="indefinite" restart="never" nodeType="tmRoot"/>
+      </p:par>
+    </p:tnLst>
+  </p:timing>
 </p:sld>
 </file>
 
@@ -10761,6 +10817,13 @@
   <p:clrMapOvr>
     <a:masterClrMapping/>
   </p:clrMapOvr>
+  <p:timing>
+    <p:tnLst>
+      <p:par>
+        <p:cTn xmlns:p14="http://schemas.microsoft.com/office/powerpoint/2010/main" id="1" dur="indefinite" restart="never" nodeType="tmRoot"/>
+      </p:par>
+    </p:tnLst>
+  </p:timing>
 </p:sld>
 </file>
 
@@ -10972,6 +11035,13 @@
   <p:clrMapOvr>
     <a:masterClrMapping/>
   </p:clrMapOvr>
+  <p:timing>
+    <p:tnLst>
+      <p:par>
+        <p:cTn xmlns:p14="http://schemas.microsoft.com/office/powerpoint/2010/main" id="1" dur="indefinite" restart="never" nodeType="tmRoot"/>
+      </p:par>
+    </p:tnLst>
+  </p:timing>
 </p:sld>
 </file>
 
@@ -11113,6 +11183,13 @@
   <p:clrMapOvr>
     <a:masterClrMapping/>
   </p:clrMapOvr>
+  <p:timing>
+    <p:tnLst>
+      <p:par>
+        <p:cTn xmlns:p14="http://schemas.microsoft.com/office/powerpoint/2010/main" id="1" dur="indefinite" restart="never" nodeType="tmRoot"/>
+      </p:par>
+    </p:tnLst>
+  </p:timing>
 </p:sld>
 </file>
 
@@ -11257,6 +11334,13 @@
   <p:clrMapOvr>
     <a:masterClrMapping/>
   </p:clrMapOvr>
+  <p:timing>
+    <p:tnLst>
+      <p:par>
+        <p:cTn xmlns:p14="http://schemas.microsoft.com/office/powerpoint/2010/main" id="1" dur="indefinite" restart="never" nodeType="tmRoot"/>
+      </p:par>
+    </p:tnLst>
+  </p:timing>
 </p:sld>
 </file>
 

</xml_diff>